<commit_message>
Update poster ppt and pdf
</commit_message>
<xml_diff>
--- a/Documentation/Phase III/ProjectPoster.pptx
+++ b/Documentation/Phase III/ProjectPoster.pptx
@@ -112,7 +112,7 @@
   </p:defaultTextStyle>
   <p:extLst>
     <p:ext uri="{EFAFB233-063F-42B5-8137-9DF3F51BA10A}">
-      <p15:sldGuideLst xmlns:p15="http://schemas.microsoft.com/office/powerpoint/2012/main" xmlns="">
+      <p15:sldGuideLst xmlns="" xmlns:p15="http://schemas.microsoft.com/office/powerpoint/2012/main">
         <p15:guide id="1" orient="horz" pos="10368">
           <p15:clr>
             <a:srgbClr val="A4A3A4"/>
@@ -126,7 +126,7 @@
       </p15:sldGuideLst>
     </p:ext>
     <p:ext uri="{2D200454-40CA-4A62-9FC3-DE9A4176ACB9}">
-      <p15:notesGuideLst xmlns:p15="http://schemas.microsoft.com/office/powerpoint/2012/main" xmlns=""/>
+      <p15:notesGuideLst xmlns="" xmlns:p15="http://schemas.microsoft.com/office/powerpoint/2012/main"/>
     </p:ext>
   </p:extLst>
 </p:presentation>
@@ -303,11 +303,11 @@
           <c:showBubbleSize val="0"/>
         </c:dLbls>
         <c:gapWidth val="150"/>
-        <c:axId val="2092156712"/>
-        <c:axId val="-2141764600"/>
+        <c:axId val="2108943272"/>
+        <c:axId val="2108946248"/>
       </c:barChart>
       <c:catAx>
-        <c:axId val="2092156712"/>
+        <c:axId val="2108943272"/>
         <c:scaling>
           <c:orientation val="minMax"/>
         </c:scaling>
@@ -316,7 +316,7 @@
         <c:majorTickMark val="out"/>
         <c:minorTickMark val="none"/>
         <c:tickLblPos val="nextTo"/>
-        <c:crossAx val="-2141764600"/>
+        <c:crossAx val="2108946248"/>
         <c:crosses val="autoZero"/>
         <c:auto val="1"/>
         <c:lblAlgn val="ctr"/>
@@ -324,7 +324,7 @@
         <c:noMultiLvlLbl val="0"/>
       </c:catAx>
       <c:valAx>
-        <c:axId val="-2141764600"/>
+        <c:axId val="2108946248"/>
         <c:scaling>
           <c:orientation val="minMax"/>
         </c:scaling>
@@ -355,7 +355,7 @@
         <c:majorTickMark val="out"/>
         <c:minorTickMark val="none"/>
         <c:tickLblPos val="nextTo"/>
-        <c:crossAx val="2092156712"/>
+        <c:crossAx val="2108943272"/>
         <c:crosses val="autoZero"/>
         <c:crossBetween val="between"/>
       </c:valAx>
@@ -503,6 +503,9 @@
                 <c:pt idx="0">
                   <c:v>15.957</c:v>
                 </c:pt>
+                <c:pt idx="1">
+                  <c:v>160.0</c:v>
+                </c:pt>
                 <c:pt idx="2">
                   <c:v>142.3405</c:v>
                 </c:pt>
@@ -519,11 +522,11 @@
           <c:showBubbleSize val="0"/>
         </c:dLbls>
         <c:gapWidth val="150"/>
-        <c:axId val="2092334680"/>
-        <c:axId val="-2141848344"/>
+        <c:axId val="2109003784"/>
+        <c:axId val="2109006760"/>
       </c:barChart>
       <c:catAx>
-        <c:axId val="2092334680"/>
+        <c:axId val="2109003784"/>
         <c:scaling>
           <c:orientation val="minMax"/>
         </c:scaling>
@@ -532,7 +535,7 @@
         <c:majorTickMark val="out"/>
         <c:minorTickMark val="none"/>
         <c:tickLblPos val="nextTo"/>
-        <c:crossAx val="-2141848344"/>
+        <c:crossAx val="2109006760"/>
         <c:crosses val="autoZero"/>
         <c:auto val="1"/>
         <c:lblAlgn val="ctr"/>
@@ -540,7 +543,7 @@
         <c:noMultiLvlLbl val="0"/>
       </c:catAx>
       <c:valAx>
-        <c:axId val="-2141848344"/>
+        <c:axId val="2109006760"/>
         <c:scaling>
           <c:orientation val="minMax"/>
         </c:scaling>
@@ -570,7 +573,7 @@
         <c:majorTickMark val="out"/>
         <c:minorTickMark val="none"/>
         <c:tickLblPos val="nextTo"/>
-        <c:crossAx val="2092334680"/>
+        <c:crossAx val="2109003784"/>
         <c:crosses val="autoZero"/>
         <c:crossBetween val="between"/>
       </c:valAx>
@@ -3827,7 +3830,7 @@
   </p:clrMapOvr>
   <p:extLst mod="1">
     <p:ext uri="{DCECCB84-F9BA-43D5-87BE-67443E8EF086}">
-      <p15:sldGuideLst xmlns:p15="http://schemas.microsoft.com/office/powerpoint/2012/main" xmlns="">
+      <p15:sldGuideLst xmlns="" xmlns:p15="http://schemas.microsoft.com/office/powerpoint/2012/main">
         <p15:guide id="1" pos="9168" userDrawn="1">
           <p15:clr>
             <a:srgbClr val="A4A3A4"/>
@@ -4448,7 +4451,7 @@
   </p:txStyles>
   <p:extLst mod="1">
     <p:ext uri="{27BBF7A9-308A-43DC-89C8-2F10F3537804}">
-      <p15:sldGuideLst xmlns:p15="http://schemas.microsoft.com/office/powerpoint/2012/main" xmlns="">
+      <p15:sldGuideLst xmlns="" xmlns:p15="http://schemas.microsoft.com/office/powerpoint/2012/main">
         <p15:guide id="1" orient="horz" pos="10368" userDrawn="1">
           <p15:clr>
             <a:srgbClr val="A4A3A4"/>
@@ -7437,13 +7440,13 @@
           <p:nvPr>
             <p:extLst>
               <p:ext uri="{D42A27DB-BD31-4B8C-83A1-F6EECF244321}">
-                <p14:modId xmlns:p14="http://schemas.microsoft.com/office/powerpoint/2010/main" val="60985479"/>
+                <p14:modId xmlns:p14="http://schemas.microsoft.com/office/powerpoint/2010/main" val="1796752983"/>
               </p:ext>
             </p:extLst>
           </p:nvPr>
         </p:nvGraphicFramePr>
         <p:xfrm>
-          <a:off x="36278941" y="16990826"/>
+          <a:off x="36278941" y="15505984"/>
           <a:ext cx="7063277" cy="3534437"/>
         </p:xfrm>
         <a:graphic>
@@ -8041,13 +8044,13 @@
           <p:nvPr>
             <p:extLst>
               <p:ext uri="{D42A27DB-BD31-4B8C-83A1-F6EECF244321}">
-                <p14:modId xmlns:p14="http://schemas.microsoft.com/office/powerpoint/2010/main" val="393235405"/>
+                <p14:modId xmlns:p14="http://schemas.microsoft.com/office/powerpoint/2010/main" val="658303559"/>
               </p:ext>
             </p:extLst>
           </p:nvPr>
         </p:nvGraphicFramePr>
         <p:xfrm>
-          <a:off x="29930399" y="16553644"/>
+          <a:off x="29930399" y="15338782"/>
           <a:ext cx="5803067" cy="4064569"/>
         </p:xfrm>
         <a:graphic>
@@ -8382,6 +8385,143 @@
                         <a:t>574692</a:t>
                       </a:r>
                       <a:endParaRPr lang="en-US" sz="1600" dirty="0"/>
+                    </a:p>
+                  </a:txBody>
+                  <a:tcPr anchor="ctr"/>
+                </a:tc>
+              </a:tr>
+            </a:tbl>
+          </a:graphicData>
+        </a:graphic>
+      </p:graphicFrame>
+      <p:graphicFrame>
+        <p:nvGraphicFramePr>
+          <p:cNvPr id="32" name="Content Placeholder 46"/>
+          <p:cNvGraphicFramePr>
+            <a:graphicFrameLocks noGrp="1"/>
+          </p:cNvGraphicFramePr>
+          <p:nvPr>
+            <p:ph sz="quarter" idx="23"/>
+            <p:extLst>
+              <p:ext uri="{D42A27DB-BD31-4B8C-83A1-F6EECF244321}">
+                <p14:modId xmlns:p14="http://schemas.microsoft.com/office/powerpoint/2010/main" val="2488567840"/>
+              </p:ext>
+            </p:extLst>
+          </p:nvPr>
+        </p:nvGraphicFramePr>
+        <p:xfrm>
+          <a:off x="31692535" y="21048394"/>
+          <a:ext cx="9056066" cy="1689419"/>
+        </p:xfrm>
+        <a:graphic>
+          <a:graphicData uri="http://schemas.openxmlformats.org/drawingml/2006/table">
+            <a:tbl>
+              <a:tblPr firstRow="1" bandRow="1">
+                <a:tableStyleId>{3B4B98B0-60AC-42C2-AFA5-B58CD77FA1E5}</a:tableStyleId>
+              </a:tblPr>
+              <a:tblGrid>
+                <a:gridCol w="3301895"/>
+                <a:gridCol w="5754171"/>
+              </a:tblGrid>
+              <a:tr h="749415">
+                <a:tc>
+                  <a:txBody>
+                    <a:bodyPr/>
+                    <a:lstStyle/>
+                    <a:p>
+                      <a:pPr algn="ctr"/>
+                      <a:r>
+                        <a:rPr lang="en-US" sz="2400" dirty="0" smtClean="0"/>
+                        <a:t>Software</a:t>
+                      </a:r>
+                      <a:endParaRPr lang="en-US" sz="2400" dirty="0"/>
+                    </a:p>
+                  </a:txBody>
+                  <a:tcPr anchor="ctr"/>
+                </a:tc>
+                <a:tc>
+                  <a:txBody>
+                    <a:bodyPr/>
+                    <a:lstStyle/>
+                    <a:p>
+                      <a:pPr algn="ctr"/>
+                      <a:r>
+                        <a:rPr lang="en-US" sz="2400" dirty="0" smtClean="0"/>
+                        <a:t>Ave.</a:t>
+                      </a:r>
+                      <a:r>
+                        <a:rPr lang="en-US" sz="2400" baseline="0" dirty="0" smtClean="0"/>
+                        <a:t> </a:t>
+                      </a:r>
+                      <a:r>
+                        <a:rPr lang="en-US" sz="2400" dirty="0" smtClean="0"/>
+                        <a:t>Data Loading and Indexing Time</a:t>
+                      </a:r>
+                      <a:endParaRPr lang="en-US" sz="2400" dirty="0"/>
+                    </a:p>
+                  </a:txBody>
+                  <a:tcPr anchor="ctr"/>
+                </a:tc>
+              </a:tr>
+              <a:tr h="470002">
+                <a:tc>
+                  <a:txBody>
+                    <a:bodyPr/>
+                    <a:lstStyle/>
+                    <a:p>
+                      <a:pPr algn="ctr"/>
+                      <a:r>
+                        <a:rPr lang="en-US" sz="2400" dirty="0" smtClean="0"/>
+                        <a:t>Jena</a:t>
+                      </a:r>
+                      <a:endParaRPr lang="en-US" sz="2400" dirty="0"/>
+                    </a:p>
+                  </a:txBody>
+                  <a:tcPr anchor="ctr"/>
+                </a:tc>
+                <a:tc>
+                  <a:txBody>
+                    <a:bodyPr/>
+                    <a:lstStyle/>
+                    <a:p>
+                      <a:pPr algn="ctr"/>
+                      <a:r>
+                        <a:rPr lang="en-US" sz="2400" b="0" dirty="0" smtClean="0"/>
+                        <a:t>10.5 seconds</a:t>
+                      </a:r>
+                      <a:endParaRPr lang="en-US" sz="2400" b="0" dirty="0"/>
+                    </a:p>
+                  </a:txBody>
+                  <a:tcPr anchor="ctr"/>
+                </a:tc>
+              </a:tr>
+              <a:tr h="470002">
+                <a:tc>
+                  <a:txBody>
+                    <a:bodyPr/>
+                    <a:lstStyle/>
+                    <a:p>
+                      <a:pPr algn="ctr"/>
+                      <a:r>
+                        <a:rPr lang="en-US" sz="2400" dirty="0" err="1" smtClean="0"/>
+                        <a:t>mongoDB</a:t>
+                      </a:r>
+                      <a:endParaRPr lang="en-US" sz="2400" dirty="0"/>
+                    </a:p>
+                  </a:txBody>
+                  <a:tcPr anchor="ctr"/>
+                </a:tc>
+                <a:tc>
+                  <a:txBody>
+                    <a:bodyPr/>
+                    <a:lstStyle/>
+                    <a:p>
+                      <a:pPr algn="ctr"/>
+                      <a:r>
+                        <a:rPr lang="en-US" sz="2400" b="0" dirty="0" smtClean="0"/>
+                        <a:t>145 seconds</a:t>
+                      </a:r>
+                      <a:endParaRPr lang="en-US" sz="2400" b="0" dirty="0"/>
                     </a:p>
                   </a:txBody>
                   <a:tcPr anchor="ctr"/>
@@ -8737,7 +8877,7 @@
   <a:extraClrSchemeLst/>
   <a:extLst>
     <a:ext uri="{05A4C25C-085E-4340-85A3-A5531E510DB2}">
-      <thm15:themeFamily xmlns:thm15="http://schemas.microsoft.com/office/thememl/2012/main" xmlns="" name="Presentation1" id="{55A68E73-61CB-4542-8C48-DCBB2482A3D5}" vid="{6A3CA63D-1E3C-4681-8668-89277FEB3FEB}"/>
+      <thm15:themeFamily xmlns="" xmlns:thm15="http://schemas.microsoft.com/office/thememl/2012/main" name="Presentation1" id="{55A68E73-61CB-4542-8C48-DCBB2482A3D5}" vid="{6A3CA63D-1E3C-4681-8668-89277FEB3FEB}"/>
     </a:ext>
   </a:extLst>
 </a:theme>
@@ -8998,7 +9138,7 @@
   <a:extraClrSchemeLst/>
   <a:extLst>
     <a:ext uri="{05A4C25C-085E-4340-85A3-A5531E510DB2}">
-      <thm15:themeFamily xmlns:thm15="http://schemas.microsoft.com/office/thememl/2012/main" xmlns="" name="Office Theme" id="{62F939B6-93AF-4DB8-9C6B-D6C7DFDC589F}" vid="{4A3C46E8-61CC-4603-A589-7422A47A8E4A}"/>
+      <thm15:themeFamily xmlns="" xmlns:thm15="http://schemas.microsoft.com/office/thememl/2012/main" name="Office Theme" id="{62F939B6-93AF-4DB8-9C6B-D6C7DFDC589F}" vid="{4A3C46E8-61CC-4603-A589-7422A47A8E4A}"/>
     </a:ext>
   </a:extLst>
 </a:theme>
@@ -9259,7 +9399,7 @@
   <a:extraClrSchemeLst/>
   <a:extLst>
     <a:ext uri="{05A4C25C-085E-4340-85A3-A5531E510DB2}">
-      <thm15:themeFamily xmlns:thm15="http://schemas.microsoft.com/office/thememl/2012/main" xmlns="" name="Office Theme" id="{62F939B6-93AF-4DB8-9C6B-D6C7DFDC589F}" vid="{4A3C46E8-61CC-4603-A589-7422A47A8E4A}"/>
+      <thm15:themeFamily xmlns="" xmlns:thm15="http://schemas.microsoft.com/office/thememl/2012/main" name="Office Theme" id="{62F939B6-93AF-4DB8-9C6B-D6C7DFDC589F}" vid="{4A3C46E8-61CC-4603-A589-7422A47A8E4A}"/>
     </a:ext>
   </a:extLst>
 </a:theme>

</xml_diff>